<commit_message>
TCR 6 Neue Lizenzen eingepflegt
</commit_message>
<xml_diff>
--- a/training-cards/music moves/Training Cards (TRC)/ger/apprentice/ger_TCR_06_Aspekte_sammeln_MM_A.pptx
+++ b/training-cards/music moves/Training Cards (TRC)/ger/apprentice/ger_TCR_06_Aspekte_sammeln_MM_A.pptx
@@ -105,6 +105,22 @@
       </a:defRPr>
     </a:lvl9pPr>
   </p:defaultTextStyle>
+  <p:extLst>
+    <p:ext uri="{EFAFB233-063F-42B5-8137-9DF3F51BA10A}">
+      <p15:sldGuideLst xmlns:p15="http://schemas.microsoft.com/office/powerpoint/2012/main">
+        <p15:guide id="1" orient="horz" pos="652">
+          <p15:clr>
+            <a:srgbClr val="A4A3A4"/>
+          </p15:clr>
+        </p15:guide>
+        <p15:guide id="2">
+          <p15:clr>
+            <a:srgbClr val="A4A3A4"/>
+          </p15:clr>
+        </p15:guide>
+      </p15:sldGuideLst>
+    </p:ext>
+  </p:extLst>
 </p:presentation>
 </file>
 
@@ -153,10 +169,9 @@
           </a:lstStyle>
           <a:p>
             <a:r>
-              <a:rPr lang="de-DE" dirty="0" smtClean="0"/>
+              <a:rPr lang="de-DE" dirty="0"/>
               <a:t>TITEL HINZUFÜGEN</a:t>
             </a:r>
-            <a:endParaRPr lang="de-DE" dirty="0"/>
           </a:p>
         </p:txBody>
       </p:sp>
@@ -187,35 +202,35 @@
           <a:p>
             <a:pPr lvl="0"/>
             <a:r>
-              <a:rPr lang="de-DE" smtClean="0"/>
+              <a:rPr lang="de-DE"/>
               <a:t>Mastertextformat bearbeiten</a:t>
             </a:r>
           </a:p>
           <a:p>
             <a:pPr lvl="1"/>
             <a:r>
-              <a:rPr lang="de-DE" smtClean="0"/>
+              <a:rPr lang="de-DE"/>
               <a:t>Zweite Ebene</a:t>
             </a:r>
           </a:p>
           <a:p>
             <a:pPr lvl="2"/>
             <a:r>
-              <a:rPr lang="de-DE" smtClean="0"/>
+              <a:rPr lang="de-DE"/>
               <a:t>Dritte Ebene</a:t>
             </a:r>
           </a:p>
           <a:p>
             <a:pPr lvl="3"/>
             <a:r>
-              <a:rPr lang="de-DE" smtClean="0"/>
+              <a:rPr lang="de-DE"/>
               <a:t>Vierte Ebene</a:t>
             </a:r>
           </a:p>
           <a:p>
             <a:pPr lvl="4"/>
             <a:r>
-              <a:rPr lang="de-DE" smtClean="0"/>
+              <a:rPr lang="de-DE"/>
               <a:t>Fünfte Ebene</a:t>
             </a:r>
             <a:endParaRPr lang="de-DE" dirty="0"/>
@@ -262,7 +277,7 @@
               <a:buNone/>
             </a:pPr>
             <a:r>
-              <a:rPr lang="de-DE" smtClean="0"/>
+              <a:rPr lang="de-DE"/>
               <a:t>Master-Untertitelformat bearbeiten</a:t>
             </a:r>
             <a:endParaRPr lang="de-DE" dirty="0"/>
@@ -378,35 +393,35 @@
           <a:p>
             <a:pPr lvl="0"/>
             <a:r>
-              <a:rPr lang="de-DE" smtClean="0"/>
+              <a:rPr lang="de-DE"/>
               <a:t>Mastertextformat bearbeiten</a:t>
             </a:r>
           </a:p>
           <a:p>
             <a:pPr lvl="1"/>
             <a:r>
-              <a:rPr lang="de-DE" smtClean="0"/>
+              <a:rPr lang="de-DE"/>
               <a:t>Zweite Ebene</a:t>
             </a:r>
           </a:p>
           <a:p>
             <a:pPr lvl="2"/>
             <a:r>
-              <a:rPr lang="de-DE" smtClean="0"/>
+              <a:rPr lang="de-DE"/>
               <a:t>Dritte Ebene</a:t>
             </a:r>
           </a:p>
           <a:p>
             <a:pPr lvl="3"/>
             <a:r>
-              <a:rPr lang="de-DE" smtClean="0"/>
+              <a:rPr lang="de-DE"/>
               <a:t>Vierte Ebene</a:t>
             </a:r>
           </a:p>
           <a:p>
             <a:pPr lvl="4"/>
             <a:r>
-              <a:rPr lang="de-DE" smtClean="0"/>
+              <a:rPr lang="de-DE"/>
               <a:t>Fünfte Ebene</a:t>
             </a:r>
             <a:endParaRPr lang="de-DE" dirty="0"/>
@@ -436,7 +451,7 @@
           <a:lstStyle/>
           <a:p>
             <a:r>
-              <a:rPr lang="de-DE" sz="2400" dirty="0" smtClean="0">
+              <a:rPr lang="de-DE" sz="2400" dirty="0">
                 <a:solidFill>
                   <a:srgbClr val="7E006B"/>
                 </a:solidFill>
@@ -446,7 +461,7 @@
               <a:t>TRAININGS</a:t>
             </a:r>
             <a:r>
-              <a:rPr lang="de-DE" sz="2400" dirty="0" smtClean="0">
+              <a:rPr lang="de-DE" sz="2400" dirty="0">
                 <a:solidFill>
                   <a:srgbClr val="7E006B"/>
                 </a:solidFill>
@@ -497,14 +512,20 @@
       </p:pic>
       <p:sp>
         <p:nvSpPr>
-          <p:cNvPr id="5" name="Shape 7"/>
+          <p:cNvPr id="4" name="Shape 7">
+            <a:extLst>
+              <a:ext uri="{FF2B5EF4-FFF2-40B4-BE49-F238E27FC236}">
+                <a16:creationId xmlns:a16="http://schemas.microsoft.com/office/drawing/2014/main" id="{666BBB5D-D141-AFED-1ADC-38C01CC6EC5E}"/>
+              </a:ext>
+            </a:extLst>
+          </p:cNvPr>
           <p:cNvSpPr/>
           <p:nvPr userDrawn="1"/>
         </p:nvSpPr>
         <p:spPr>
           <a:xfrm>
-            <a:off x="1683417" y="4952581"/>
-            <a:ext cx="4196016" cy="276995"/>
+            <a:off x="971550" y="4689585"/>
+            <a:ext cx="4691860" cy="461661"/>
           </a:xfrm>
           <a:prstGeom prst="rect">
             <a:avLst/>
@@ -514,12 +535,12 @@
           </a:ln>
           <a:extLst>
             <a:ext uri="{C572A759-6A51-4108-AA02-DFA0A04FC94B}">
-              <ma14:wrappingTextBoxFlag xmlns:ma14="http://schemas.microsoft.com/office/mac/drawingml/2011/main" val="1"/>
+              <ma14:wrappingTextBoxFlag xmlns="" xmlns:ma14="http://schemas.microsoft.com/office/mac/drawingml/2011/main" val="1"/>
             </a:ext>
           </a:extLst>
         </p:spPr>
         <p:txBody>
-          <a:bodyPr wrap="none" lIns="45718" tIns="45718" rIns="45718" bIns="45718">
+          <a:bodyPr wrap="square" lIns="45718" tIns="45718" rIns="45718" bIns="45718">
             <a:spAutoFit/>
           </a:bodyPr>
           <a:lstStyle/>
@@ -528,49 +549,266 @@
               <a:defRPr sz="1800"/>
             </a:pPr>
             <a:r>
-              <a:rPr sz="600" dirty="0">
-                <a:latin typeface="Avenir Light"/>
+              <a:rPr lang="de-DE" sz="800" b="0" i="0" u="none" strike="noStrike" dirty="0" err="1">
+                <a:solidFill>
+                  <a:schemeClr val="tx1">
+                    <a:lumMod val="65000"/>
+                    <a:lumOff val="35000"/>
+                  </a:schemeClr>
+                </a:solidFill>
+                <a:effectLst/>
+                <a:latin typeface="Avenir Book" panose="02000503020000020003" pitchFamily="2" charset="0"/>
+              </a:rPr>
+              <a:t>music</a:t>
+            </a:r>
+            <a:r>
+              <a:rPr lang="de-DE" sz="800" b="0" i="0" u="none" strike="noStrike" dirty="0">
+                <a:solidFill>
+                  <a:schemeClr val="tx1">
+                    <a:lumMod val="65000"/>
+                    <a:lumOff val="35000"/>
+                  </a:schemeClr>
+                </a:solidFill>
+                <a:effectLst/>
+                <a:latin typeface="Avenir Book" panose="02000503020000020003" pitchFamily="2" charset="0"/>
+              </a:rPr>
+              <a:t> </a:t>
+            </a:r>
+            <a:r>
+              <a:rPr lang="de-DE" sz="800" b="0" i="0" u="none" strike="noStrike" dirty="0" err="1">
+                <a:solidFill>
+                  <a:schemeClr val="tx1">
+                    <a:lumMod val="65000"/>
+                    <a:lumOff val="35000"/>
+                  </a:schemeClr>
+                </a:solidFill>
+                <a:effectLst/>
+                <a:latin typeface="Avenir Book" panose="02000503020000020003" pitchFamily="2" charset="0"/>
+              </a:rPr>
+              <a:t>moves</a:t>
+            </a:r>
+            <a:r>
+              <a:rPr lang="de-DE" sz="800" b="0" i="0" u="none" strike="noStrike" dirty="0">
+                <a:solidFill>
+                  <a:schemeClr val="tx1">
+                    <a:lumMod val="65000"/>
+                    <a:lumOff val="35000"/>
+                  </a:schemeClr>
+                </a:solidFill>
+                <a:effectLst/>
+                <a:latin typeface="Avenir Book" panose="02000503020000020003" pitchFamily="2" charset="0"/>
+              </a:rPr>
+              <a:t>-Trainingskarten von Regina Brandhuber sind lizenziert unter einer Creative Commons </a:t>
+            </a:r>
+          </a:p>
+          <a:p>
+            <a:pPr lvl="0" algn="ctr">
+              <a:defRPr sz="1800"/>
+            </a:pPr>
+            <a:r>
+              <a:rPr lang="de-DE" sz="800" b="0" i="0" u="none" strike="noStrike" dirty="0">
+                <a:solidFill>
+                  <a:schemeClr val="tx1">
+                    <a:lumMod val="65000"/>
+                    <a:lumOff val="35000"/>
+                  </a:schemeClr>
+                </a:solidFill>
+                <a:effectLst/>
+                <a:latin typeface="Avenir Book" panose="02000503020000020003" pitchFamily="2" charset="0"/>
+              </a:rPr>
+              <a:t>Namensnennung-Nicht kommerziell 4.0 International Lizenz.</a:t>
+            </a:r>
+          </a:p>
+          <a:p>
+            <a:pPr lvl="0" algn="ctr">
+              <a:defRPr sz="1800"/>
+            </a:pPr>
+            <a:r>
+              <a:rPr lang="de-DE" sz="800" dirty="0">
+                <a:solidFill>
+                  <a:schemeClr val="tx1">
+                    <a:lumMod val="65000"/>
+                    <a:lumOff val="35000"/>
+                  </a:schemeClr>
+                </a:solidFill>
+                <a:latin typeface="Avenir Book" panose="02000503020000020003" pitchFamily="2" charset="0"/>
                 <a:ea typeface="Calibri"/>
                 <a:cs typeface="Avenir Light"/>
                 <a:sym typeface="Calibri"/>
               </a:rPr>
-              <a:t>This work is licensed under the Creative Commons Attribution-NonCommercial-NoDerivatives 4.0 International License. </a:t>
-            </a:r>
-          </a:p>
-          <a:p>
-            <a:pPr lvl="0" algn="ctr">
-              <a:defRPr sz="1800"/>
-            </a:pPr>
-            <a:r>
-              <a:rPr sz="600" dirty="0">
-                <a:latin typeface="Avenir Light"/>
+              <a:t>Nachzulesen unter:</a:t>
+            </a:r>
+            <a:r>
+              <a:rPr sz="800" dirty="0">
+                <a:solidFill>
+                  <a:schemeClr val="tx1">
+                    <a:lumMod val="65000"/>
+                    <a:lumOff val="35000"/>
+                  </a:schemeClr>
+                </a:solidFill>
+                <a:latin typeface="Avenir Book" panose="02000503020000020003" pitchFamily="2" charset="0"/>
                 <a:ea typeface="Calibri"/>
                 <a:cs typeface="Avenir Light"/>
                 <a:sym typeface="Calibri"/>
               </a:rPr>
-              <a:t>To view a copy of this license, visit http://creativecommons.org/licenses/by-nc-nd/4.0/.</a:t>
-            </a:r>
+              <a:t> </a:t>
+            </a:r>
+            <a:r>
+              <a:rPr lang="de-DE" sz="800" dirty="0">
+                <a:solidFill>
+                  <a:schemeClr val="tx1">
+                    <a:lumMod val="65000"/>
+                    <a:lumOff val="35000"/>
+                  </a:schemeClr>
+                </a:solidFill>
+                <a:latin typeface="Avenir Book" panose="02000503020000020003" pitchFamily="2" charset="0"/>
+                <a:ea typeface="Calibri"/>
+                <a:cs typeface="Avenir Light"/>
+                <a:sym typeface="Calibri"/>
+              </a:rPr>
+              <a:t>https://</a:t>
+            </a:r>
+            <a:r>
+              <a:rPr lang="de-DE" sz="800" dirty="0" err="1">
+                <a:solidFill>
+                  <a:schemeClr val="tx1">
+                    <a:lumMod val="65000"/>
+                    <a:lumOff val="35000"/>
+                  </a:schemeClr>
+                </a:solidFill>
+                <a:latin typeface="Avenir Book" panose="02000503020000020003" pitchFamily="2" charset="0"/>
+                <a:ea typeface="Calibri"/>
+                <a:cs typeface="Avenir Light"/>
+                <a:sym typeface="Calibri"/>
+              </a:rPr>
+              <a:t>creativecommons.org</a:t>
+            </a:r>
+            <a:r>
+              <a:rPr lang="de-DE" sz="800" dirty="0">
+                <a:solidFill>
+                  <a:schemeClr val="tx1">
+                    <a:lumMod val="65000"/>
+                    <a:lumOff val="35000"/>
+                  </a:schemeClr>
+                </a:solidFill>
+                <a:latin typeface="Avenir Book" panose="02000503020000020003" pitchFamily="2" charset="0"/>
+                <a:ea typeface="Calibri"/>
+                <a:cs typeface="Avenir Light"/>
+                <a:sym typeface="Calibri"/>
+              </a:rPr>
+              <a:t>/</a:t>
+            </a:r>
+            <a:r>
+              <a:rPr lang="de-DE" sz="800" dirty="0" err="1">
+                <a:solidFill>
+                  <a:schemeClr val="tx1">
+                    <a:lumMod val="65000"/>
+                    <a:lumOff val="35000"/>
+                  </a:schemeClr>
+                </a:solidFill>
+                <a:latin typeface="Avenir Book" panose="02000503020000020003" pitchFamily="2" charset="0"/>
+                <a:ea typeface="Calibri"/>
+                <a:cs typeface="Avenir Light"/>
+                <a:sym typeface="Calibri"/>
+              </a:rPr>
+              <a:t>licenses</a:t>
+            </a:r>
+            <a:r>
+              <a:rPr lang="de-DE" sz="800" dirty="0">
+                <a:solidFill>
+                  <a:schemeClr val="tx1">
+                    <a:lumMod val="65000"/>
+                    <a:lumOff val="35000"/>
+                  </a:schemeClr>
+                </a:solidFill>
+                <a:latin typeface="Avenir Book" panose="02000503020000020003" pitchFamily="2" charset="0"/>
+                <a:ea typeface="Calibri"/>
+                <a:cs typeface="Avenir Light"/>
+                <a:sym typeface="Calibri"/>
+              </a:rPr>
+              <a:t>/</a:t>
+            </a:r>
+            <a:r>
+              <a:rPr lang="de-DE" sz="800" dirty="0" err="1">
+                <a:solidFill>
+                  <a:schemeClr val="tx1">
+                    <a:lumMod val="65000"/>
+                    <a:lumOff val="35000"/>
+                  </a:schemeClr>
+                </a:solidFill>
+                <a:latin typeface="Avenir Book" panose="02000503020000020003" pitchFamily="2" charset="0"/>
+                <a:ea typeface="Calibri"/>
+                <a:cs typeface="Avenir Light"/>
+                <a:sym typeface="Calibri"/>
+              </a:rPr>
+              <a:t>by-nc</a:t>
+            </a:r>
+            <a:r>
+              <a:rPr lang="de-DE" sz="800" dirty="0">
+                <a:solidFill>
+                  <a:schemeClr val="tx1">
+                    <a:lumMod val="65000"/>
+                    <a:lumOff val="35000"/>
+                  </a:schemeClr>
+                </a:solidFill>
+                <a:latin typeface="Avenir Book" panose="02000503020000020003" pitchFamily="2" charset="0"/>
+                <a:ea typeface="Calibri"/>
+                <a:cs typeface="Avenir Light"/>
+                <a:sym typeface="Calibri"/>
+              </a:rPr>
+              <a:t>/4.0/</a:t>
+            </a:r>
+            <a:r>
+              <a:rPr lang="de-DE" sz="800" dirty="0" err="1">
+                <a:solidFill>
+                  <a:schemeClr val="tx1">
+                    <a:lumMod val="65000"/>
+                    <a:lumOff val="35000"/>
+                  </a:schemeClr>
+                </a:solidFill>
+                <a:latin typeface="Avenir Book" panose="02000503020000020003" pitchFamily="2" charset="0"/>
+                <a:ea typeface="Calibri"/>
+                <a:cs typeface="Avenir Light"/>
+                <a:sym typeface="Calibri"/>
+              </a:rPr>
+              <a:t>deed.de</a:t>
+            </a:r>
+            <a:endParaRPr sz="800" dirty="0">
+              <a:solidFill>
+                <a:schemeClr val="tx1">
+                  <a:lumMod val="65000"/>
+                  <a:lumOff val="35000"/>
+                </a:schemeClr>
+              </a:solidFill>
+              <a:latin typeface="Avenir Book" panose="02000503020000020003" pitchFamily="2" charset="0"/>
+              <a:ea typeface="Calibri"/>
+              <a:cs typeface="Avenir Light"/>
+              <a:sym typeface="Calibri"/>
+            </a:endParaRPr>
           </a:p>
         </p:txBody>
       </p:sp>
       <p:pic>
         <p:nvPicPr>
-          <p:cNvPr id="6" name="pasted-image.tif"/>
+          <p:cNvPr id="8" name="pasted-image.tif">
+            <a:extLst>
+              <a:ext uri="{FF2B5EF4-FFF2-40B4-BE49-F238E27FC236}">
+                <a16:creationId xmlns:a16="http://schemas.microsoft.com/office/drawing/2014/main" id="{A154DB5E-A75C-8FD7-252E-877BC409EDDC}"/>
+              </a:ext>
+            </a:extLst>
+          </p:cNvPr>
           <p:cNvPicPr/>
           <p:nvPr userDrawn="1"/>
         </p:nvPicPr>
-        <p:blipFill>
-          <a:blip r:embed="rId4">
-            <a:extLst/>
-          </a:blip>
-          <a:stretch>
-            <a:fillRect/>
-          </a:stretch>
+        <p:blipFill rotWithShape="1">
+          <a:blip r:embed="rId4"/>
+          <a:srcRect r="24777" b="-3233"/>
+          <a:stretch/>
         </p:blipFill>
         <p:spPr>
           <a:xfrm>
-            <a:off x="6174185" y="4992838"/>
-            <a:ext cx="886619" cy="214128"/>
+            <a:off x="5724347" y="4733926"/>
+            <a:ext cx="1009828" cy="333374"/>
           </a:xfrm>
           <a:prstGeom prst="rect">
             <a:avLst/>
@@ -580,58 +818,6 @@
           </a:ln>
         </p:spPr>
       </p:pic>
-      <p:sp>
-        <p:nvSpPr>
-          <p:cNvPr id="7" name="Textfeld 6"/>
-          <p:cNvSpPr txBox="1"/>
-          <p:nvPr userDrawn="1"/>
-        </p:nvSpPr>
-        <p:spPr>
-          <a:xfrm>
-            <a:off x="239285" y="4936890"/>
-            <a:ext cx="1044856" cy="276999"/>
-          </a:xfrm>
-          <a:prstGeom prst="rect">
-            <a:avLst/>
-          </a:prstGeom>
-          <a:noFill/>
-        </p:spPr>
-        <p:txBody>
-          <a:bodyPr wrap="square" rtlCol="0">
-            <a:spAutoFit/>
-          </a:bodyPr>
-          <a:lstStyle/>
-          <a:p>
-            <a:r>
-              <a:rPr lang="de-DE" sz="600" dirty="0">
-                <a:solidFill>
-                  <a:srgbClr val="5D5E5F"/>
-                </a:solidFill>
-                <a:latin typeface="Avenir Light"/>
-                <a:cs typeface="Avenir Light"/>
-              </a:rPr>
-              <a:t>Letzte Änderung: </a:t>
-            </a:r>
-            <a:fld id="{7A8C7DAC-E536-564C-B5B3-90E8FAB50562}" type="datetime1">
-              <a:rPr lang="de-DE" sz="600" smtClean="0">
-                <a:solidFill>
-                  <a:srgbClr val="5D5E5F"/>
-                </a:solidFill>
-                <a:latin typeface="Avenir Light"/>
-                <a:cs typeface="Avenir Light"/>
-              </a:rPr>
-              <a:t>24.01.16</a:t>
-            </a:fld>
-            <a:endParaRPr lang="de-DE" sz="600" dirty="0">
-              <a:solidFill>
-                <a:srgbClr val="5D5E5F"/>
-              </a:solidFill>
-              <a:latin typeface="Avenir Light"/>
-              <a:cs typeface="Avenir Light"/>
-            </a:endParaRPr>
-          </a:p>
-        </p:txBody>
-      </p:sp>
     </p:spTree>
     <p:extLst>
       <p:ext uri="{BB962C8B-B14F-4D97-AF65-F5344CB8AC3E}">
@@ -678,10 +864,9 @@
           <a:lstStyle/>
           <a:p>
             <a:r>
-              <a:rPr lang="de-DE" smtClean="0"/>
+              <a:rPr lang="de-DE"/>
               <a:t>Mastertitelformat bearbeiten</a:t>
             </a:r>
-            <a:endParaRPr lang="de-DE"/>
           </a:p>
         </p:txBody>
       </p:sp>
@@ -702,7 +887,7 @@
           <a:p>
             <a:fld id="{FF5B2BAF-DF38-0A48-A798-0C06E514FD52}" type="datetimeFigureOut">
               <a:rPr lang="de-DE" smtClean="0"/>
-              <a:t>24.01.16</a:t>
+              <a:t>25.07.23</a:t>
             </a:fld>
             <a:endParaRPr lang="de-DE" dirty="0"/>
           </a:p>
@@ -813,17 +998,16 @@
           <a:p>
             <a:pPr marL="0" lvl="0" algn="l"/>
             <a:r>
-              <a:rPr lang="de-DE" dirty="0" smtClean="0"/>
+              <a:rPr lang="de-DE" dirty="0"/>
               <a:t>Überschrift </a:t>
             </a:r>
             <a:br>
-              <a:rPr lang="de-DE" dirty="0" smtClean="0"/>
+              <a:rPr lang="de-DE" dirty="0"/>
             </a:br>
             <a:r>
-              <a:rPr lang="de-DE" dirty="0" smtClean="0"/>
+              <a:rPr lang="de-DE" dirty="0"/>
               <a:t>bearbeiten </a:t>
             </a:r>
-            <a:endParaRPr lang="de-DE" dirty="0"/>
           </a:p>
         </p:txBody>
       </p:sp>
@@ -854,38 +1038,37 @@
           <a:p>
             <a:pPr lvl="0"/>
             <a:r>
-              <a:rPr lang="de-DE" dirty="0" smtClean="0"/>
+              <a:rPr lang="de-DE" dirty="0"/>
               <a:t>Mastertextformat bearbeiten</a:t>
             </a:r>
           </a:p>
           <a:p>
             <a:pPr lvl="1"/>
             <a:r>
-              <a:rPr lang="de-DE" dirty="0" smtClean="0"/>
+              <a:rPr lang="de-DE" dirty="0"/>
               <a:t>Zweite Ebene</a:t>
             </a:r>
           </a:p>
           <a:p>
             <a:pPr lvl="2"/>
             <a:r>
-              <a:rPr lang="de-DE" dirty="0" smtClean="0"/>
+              <a:rPr lang="de-DE" dirty="0"/>
               <a:t>Dritte Ebene</a:t>
             </a:r>
           </a:p>
           <a:p>
             <a:pPr lvl="3"/>
             <a:r>
-              <a:rPr lang="de-DE" dirty="0" smtClean="0"/>
+              <a:rPr lang="de-DE" dirty="0"/>
               <a:t>Vierte Ebene</a:t>
             </a:r>
           </a:p>
           <a:p>
             <a:pPr lvl="4"/>
             <a:r>
-              <a:rPr lang="de-DE" dirty="0" smtClean="0"/>
+              <a:rPr lang="de-DE" dirty="0"/>
               <a:t>Fünfte Ebene</a:t>
             </a:r>
-            <a:endParaRPr lang="de-DE" dirty="0"/>
           </a:p>
         </p:txBody>
       </p:sp>
@@ -924,7 +1107,7 @@
           <a:p>
             <a:fld id="{FF5B2BAF-DF38-0A48-A798-0C06E514FD52}" type="datetimeFigureOut">
               <a:rPr lang="de-DE" smtClean="0"/>
-              <a:t>24.01.16</a:t>
+              <a:t>25.07.23</a:t>
             </a:fld>
             <a:endParaRPr lang="de-DE" dirty="0"/>
           </a:p>
@@ -1158,7 +1341,7 @@
           <a:lstStyle/>
           <a:p>
             <a:r>
-              <a:rPr lang="de-DE" sz="1050" b="1" dirty="0" smtClean="0">
+              <a:rPr lang="de-DE" sz="1050" b="1" dirty="0">
                 <a:solidFill>
                   <a:schemeClr val="bg1"/>
                 </a:solidFill>
@@ -1168,7 +1351,7 @@
               <a:t>TRAININGSKARTE</a:t>
             </a:r>
             <a:r>
-              <a:rPr lang="de-DE" sz="1050" dirty="0" smtClean="0">
+              <a:rPr lang="de-DE" sz="1050" dirty="0">
                 <a:solidFill>
                   <a:schemeClr val="bg1"/>
                 </a:solidFill>
@@ -1178,7 +1361,7 @@
               <a:t> </a:t>
             </a:r>
             <a:r>
-              <a:rPr lang="de-DE" sz="1050" b="1" dirty="0" smtClean="0">
+              <a:rPr lang="de-DE" sz="1050" b="1" dirty="0">
                 <a:solidFill>
                   <a:schemeClr val="bg1"/>
                 </a:solidFill>
@@ -1187,13 +1370,6 @@
               </a:rPr>
               <a:t>TCR 06</a:t>
             </a:r>
-            <a:endParaRPr lang="de-DE" sz="1050" b="1" dirty="0">
-              <a:solidFill>
-                <a:schemeClr val="bg1"/>
-              </a:solidFill>
-              <a:latin typeface="Avenir Heavy"/>
-              <a:cs typeface="Avenir Heavy"/>
-            </a:endParaRPr>
           </a:p>
         </p:txBody>
       </p:sp>
@@ -1576,24 +1752,16 @@
           <a:lstStyle/>
           <a:p>
             <a:r>
-              <a:rPr lang="de-DE" dirty="0" smtClean="0">
+              <a:rPr lang="de-DE" dirty="0">
                 <a:latin typeface="Avenir Heavy"/>
                 <a:cs typeface="Avenir Heavy"/>
               </a:rPr>
-              <a:t>ASPEKTE</a:t>
-            </a:r>
-            <a:r>
-              <a:rPr lang="de-DE" dirty="0" smtClean="0">
-                <a:latin typeface="Avenir Heavy"/>
-                <a:cs typeface="Avenir Heavy"/>
-              </a:rPr>
-              <a:t> </a:t>
-            </a:r>
-            <a:r>
-              <a:rPr lang="de-DE" dirty="0" smtClean="0"/>
+              <a:t>ASPEKTE </a:t>
+            </a:r>
+            <a:r>
+              <a:rPr lang="de-DE" dirty="0"/>
               <a:t>SAMMELN</a:t>
             </a:r>
-            <a:endParaRPr lang="de-DE" dirty="0"/>
           </a:p>
         </p:txBody>
       </p:sp>
@@ -1607,7 +1775,12 @@
             <p:ph idx="13"/>
           </p:nvPr>
         </p:nvSpPr>
-        <p:spPr/>
+        <p:spPr>
+          <a:xfrm>
+            <a:off x="858838" y="1568452"/>
+            <a:ext cx="6113462" cy="3133835"/>
+          </a:xfrm>
+        </p:spPr>
         <p:txBody>
           <a:bodyPr>
             <a:noAutofit/>
@@ -1616,15 +1789,7 @@
           <a:p>
             <a:r>
               <a:rPr lang="de-DE" sz="1200" dirty="0"/>
-              <a:t>Zu Beginn Deines Trainings hast Du </a:t>
-            </a:r>
-            <a:r>
-              <a:rPr lang="de-DE" sz="1200" dirty="0" err="1"/>
-              <a:t>evtl</a:t>
-            </a:r>
-            <a:r>
-              <a:rPr lang="de-DE" sz="1200" dirty="0"/>
-              <a:t>, bereits einige Aspekte im Kopf, was Dir das Ganze bringen soll. </a:t>
+              <a:t>Zu Beginn Deines Trainings hast Du evtl., bereits einige Aspekte im Kopf, was Dir das Ganze bringen soll. </a:t>
             </a:r>
           </a:p>
           <a:p>
@@ -1661,15 +1826,7 @@
             </a:pPr>
             <a:r>
               <a:rPr lang="de-DE" sz="1200" dirty="0"/>
-              <a:t> </a:t>
-            </a:r>
-            <a:r>
-              <a:rPr lang="de-DE" sz="1200" dirty="0" smtClean="0"/>
-              <a:t>      All </a:t>
-            </a:r>
-            <a:r>
-              <a:rPr lang="de-DE" sz="1200" dirty="0"/>
-              <a:t>das sind Aspekte Deines Trainings, die Du nun sammeln kannst.</a:t>
+              <a:t>       All das sind Aspekte Deines Trainings, die Du nun aufschreiben kannst.</a:t>
             </a:r>
           </a:p>
           <a:p>
@@ -1681,7 +1838,7 @@
           <a:p>
             <a:r>
               <a:rPr lang="de-DE" sz="1200" dirty="0"/>
-              <a:t>Durch die schriftliche Reflexion Deines Trainings setzt Du Dich nochmal neu damit auseinander. Das vertieft Deine Wahrnehmung. Aufgefordert zu sein etwas so nachvollziehbar zu machen, dass andere es direkt übernehmen können, bringt Dich selbst in eine gewisse Lehrerrolle. Ach ja...den Spruch kennst Du ja.... "</a:t>
+              <a:t>Durch die schriftliche Reflexion Deines Trainings setzt Du Dich noch einmal neu damit auseinander. Das vertieft Deine Wahrnehmung. Aufgefordert zu sein etwas so nachvollziehbar zu machen, dass andere es direkt übernehmen können, bringt Dich selbst in eine gewisse Lehrerrolle."</a:t>
             </a:r>
             <a:r>
               <a:rPr lang="de-DE" sz="1200" dirty="0" err="1"/>
@@ -1777,10 +1934,9 @@
               <a:buNone/>
             </a:pPr>
             <a:r>
-              <a:rPr lang="de-DE" dirty="0" smtClean="0"/>
+              <a:rPr lang="de-DE" dirty="0"/>
               <a:t>Regina Brandhuber</a:t>
             </a:r>
-            <a:endParaRPr lang="de-DE" dirty="0"/>
           </a:p>
         </p:txBody>
       </p:sp>
@@ -1837,7 +1993,7 @@
           <a:p>
             <a:r>
               <a:rPr lang="de-DE" dirty="0"/>
-              <a:t>Für jede Variante (also für jede Erstellung einer Trainingskarte) hast du 2 Wochen Zeit, also insgesamt 4 Wochen. Natürlich kannst Du auch gleich 2 Trainingskarten parallel entstehen lassen und diese Karte zusammen mit den anderen verschränkten Karten innerhalb von 2 Wochen erledigen.</a:t>
+              <a:t>Für jede Variante (also für jede Erstellung einer Trainingskarte) hast du 2 Wochen Zeit, also insgesamt 4 Wochen. Natürlich kannst Du auch gleich 2 Trainingskarten parallel entstehen lassen und diese Karte zusammen mit den anderen Karten dieses Trainingsplans innerhalb von 2 Wochen erledigen.</a:t>
             </a:r>
           </a:p>
           <a:p>
@@ -1848,29 +2004,32 @@
           </a:p>
           <a:p>
             <a:r>
+              <a:rPr lang="de-DE" dirty="0"/>
+              <a:t>Diese Karte wird automatisch zertifiziert, sobald Dein Team </a:t>
+            </a:r>
+            <a:r>
               <a:rPr lang="de-DE"/>
-              <a:t>Diese Karte wird automatisch zertifiziert, sobald Dein Team Dir die </a:t>
+              <a:t>Dir die Karte </a:t>
+            </a:r>
+            <a:r>
+              <a:rPr lang="de-DE" dirty="0"/>
+              <a:t>TRC </a:t>
             </a:r>
             <a:r>
               <a:rPr lang="de-DE"/>
-              <a:t>verschränkte </a:t>
-            </a:r>
-            <a:r>
-              <a:rPr lang="de-DE"/>
-              <a:t/>
+              <a:t>08 </a:t>
             </a:r>
             <a:br>
               <a:rPr lang="de-DE"/>
             </a:br>
             <a:r>
-              <a:rPr lang="de-DE" smtClean="0"/>
-              <a:t>Karte </a:t>
-            </a:r>
-            <a:r>
               <a:rPr lang="de-DE"/>
-              <a:t>TRC 08 zertifiziert hat.</a:t>
-            </a:r>
-            <a:endParaRPr lang="de-DE" dirty="0"/>
+              <a:t>zertifiziert </a:t>
+            </a:r>
+            <a:r>
+              <a:rPr lang="de-DE" dirty="0"/>
+              <a:t>hat.</a:t>
+            </a:r>
           </a:p>
         </p:txBody>
       </p:sp>

</xml_diff>